<commit_message>
adjustments to challenge 1
</commit_message>
<xml_diff>
--- a/proj.pptx
+++ b/proj.pptx
@@ -3525,7 +3525,7 @@
           <a:p>
             <a:fld id="{ED7CDB75-08E8-4789-905E-7568787CB071}" type="datetimeFigureOut">
               <a:rPr lang="pt-PT" smtClean="0"/>
-              <a:t>07/11/2020</a:t>
+              <a:t>15/11/2020</a:t>
             </a:fld>
             <a:endParaRPr lang="pt-PT"/>
           </a:p>
@@ -3726,7 +3726,7 @@
           <a:p>
             <a:fld id="{ED7CDB75-08E8-4789-905E-7568787CB071}" type="datetimeFigureOut">
               <a:rPr lang="pt-PT" smtClean="0"/>
-              <a:t>07/11/2020</a:t>
+              <a:t>15/11/2020</a:t>
             </a:fld>
             <a:endParaRPr lang="pt-PT"/>
           </a:p>
@@ -3937,7 +3937,7 @@
           <a:p>
             <a:fld id="{ED7CDB75-08E8-4789-905E-7568787CB071}" type="datetimeFigureOut">
               <a:rPr lang="pt-PT" smtClean="0"/>
-              <a:t>07/11/2020</a:t>
+              <a:t>15/11/2020</a:t>
             </a:fld>
             <a:endParaRPr lang="pt-PT"/>
           </a:p>
@@ -5160,7 +5160,7 @@
           <a:p>
             <a:fld id="{ED7CDB75-08E8-4789-905E-7568787CB071}" type="datetimeFigureOut">
               <a:rPr lang="pt-PT" smtClean="0"/>
-              <a:t>07/11/2020</a:t>
+              <a:t>15/11/2020</a:t>
             </a:fld>
             <a:endParaRPr lang="pt-PT"/>
           </a:p>
@@ -5437,7 +5437,7 @@
           <a:p>
             <a:fld id="{ED7CDB75-08E8-4789-905E-7568787CB071}" type="datetimeFigureOut">
               <a:rPr lang="pt-PT" smtClean="0"/>
-              <a:t>07/11/2020</a:t>
+              <a:t>15/11/2020</a:t>
             </a:fld>
             <a:endParaRPr lang="pt-PT"/>
           </a:p>
@@ -5706,7 +5706,7 @@
           <a:p>
             <a:fld id="{ED7CDB75-08E8-4789-905E-7568787CB071}" type="datetimeFigureOut">
               <a:rPr lang="pt-PT" smtClean="0"/>
-              <a:t>07/11/2020</a:t>
+              <a:t>15/11/2020</a:t>
             </a:fld>
             <a:endParaRPr lang="pt-PT"/>
           </a:p>
@@ -6122,7 +6122,7 @@
           <a:p>
             <a:fld id="{ED7CDB75-08E8-4789-905E-7568787CB071}" type="datetimeFigureOut">
               <a:rPr lang="pt-PT" smtClean="0"/>
-              <a:t>07/11/2020</a:t>
+              <a:t>15/11/2020</a:t>
             </a:fld>
             <a:endParaRPr lang="pt-PT"/>
           </a:p>
@@ -6265,7 +6265,7 @@
           <a:p>
             <a:fld id="{ED7CDB75-08E8-4789-905E-7568787CB071}" type="datetimeFigureOut">
               <a:rPr lang="pt-PT" smtClean="0"/>
-              <a:t>07/11/2020</a:t>
+              <a:t>15/11/2020</a:t>
             </a:fld>
             <a:endParaRPr lang="pt-PT"/>
           </a:p>
@@ -6379,7 +6379,7 @@
           <a:p>
             <a:fld id="{ED7CDB75-08E8-4789-905E-7568787CB071}" type="datetimeFigureOut">
               <a:rPr lang="pt-PT" smtClean="0"/>
-              <a:t>07/11/2020</a:t>
+              <a:t>15/11/2020</a:t>
             </a:fld>
             <a:endParaRPr lang="pt-PT"/>
           </a:p>
@@ -6693,7 +6693,7 @@
           <a:p>
             <a:fld id="{ED7CDB75-08E8-4789-905E-7568787CB071}" type="datetimeFigureOut">
               <a:rPr lang="pt-PT" smtClean="0"/>
-              <a:t>07/11/2020</a:t>
+              <a:t>15/11/2020</a:t>
             </a:fld>
             <a:endParaRPr lang="pt-PT"/>
           </a:p>
@@ -6983,7 +6983,7 @@
           <a:p>
             <a:fld id="{ED7CDB75-08E8-4789-905E-7568787CB071}" type="datetimeFigureOut">
               <a:rPr lang="pt-PT" smtClean="0"/>
-              <a:t>07/11/2020</a:t>
+              <a:t>15/11/2020</a:t>
             </a:fld>
             <a:endParaRPr lang="pt-PT"/>
           </a:p>
@@ -7227,7 +7227,7 @@
           <a:p>
             <a:fld id="{ED7CDB75-08E8-4789-905E-7568787CB071}" type="datetimeFigureOut">
               <a:rPr lang="pt-PT" smtClean="0"/>
-              <a:t>07/11/2020</a:t>
+              <a:t>15/11/2020</a:t>
             </a:fld>
             <a:endParaRPr lang="pt-PT"/>
           </a:p>
@@ -8952,21 +8952,21 @@
           <p:nvPr>
             <p:extLst>
               <p:ext uri="{D42A27DB-BD31-4B8C-83A1-F6EECF244321}">
-                <p14:modId xmlns:p14="http://schemas.microsoft.com/office/powerpoint/2010/main" val="2230413670"/>
+                <p14:modId xmlns:p14="http://schemas.microsoft.com/office/powerpoint/2010/main" val="3307223384"/>
               </p:ext>
             </p:extLst>
           </p:nvPr>
         </p:nvGraphicFramePr>
         <p:xfrm>
-          <a:off x="2051663" y="2865202"/>
-          <a:ext cx="19305947" cy="3572174"/>
+          <a:off x="326749" y="2882076"/>
+          <a:ext cx="22755773" cy="3545449"/>
         </p:xfrm>
         <a:graphic>
           <a:graphicData uri="http://schemas.openxmlformats.org/drawingml/2006/table">
             <a:tbl>
               <a:tblPr/>
               <a:tblGrid>
-                <a:gridCol w="19305947">
+                <a:gridCol w="22755773">
                   <a:extLst>
                     <a:ext uri="{9D8B030D-6E8A-4147-A177-3AD203B41FA5}">
                       <a16:colId xmlns:a16="http://schemas.microsoft.com/office/drawing/2014/main" val="1494569832"/>
@@ -8974,7 +8974,7 @@
                   </a:extLst>
                 </a:gridCol>
               </a:tblGrid>
-              <a:tr h="3572174">
+              <a:tr h="3545449">
                 <a:tc>
                   <a:txBody>
                     <a:bodyPr/>
@@ -8989,7 +8989,7 @@
                         </a:spcAft>
                       </a:pPr>
                       <a:r>
-                        <a:rPr lang="en-US" sz="3200" b="1" i="0" u="none" strike="noStrike" dirty="0">
+                        <a:rPr lang="en-US" sz="3100" b="1" noProof="1">
                           <a:solidFill>
                             <a:srgbClr val="800000"/>
                           </a:solidFill>
@@ -9000,15 +9000,14 @@
                         <a:t>create</a:t>
                       </a:r>
                       <a:r>
-                        <a:rPr lang="en-US" sz="3200" b="0" i="0" u="none" strike="noStrike" dirty="0">
-                          <a:effectLst/>
+                        <a:rPr lang="en-US" sz="3100" noProof="1">
                           <a:latin typeface="Courier New" panose="02070309020205020404" pitchFamily="49" charset="0"/>
                           <a:cs typeface="Courier New" panose="02070309020205020404" pitchFamily="49" charset="0"/>
                         </a:rPr>
                         <a:t> </a:t>
                       </a:r>
                       <a:r>
-                        <a:rPr lang="en-US" sz="3200" b="0" i="0" u="none" strike="noStrike" dirty="0">
+                        <a:rPr lang="en-US" sz="3100" noProof="1">
                           <a:solidFill>
                             <a:srgbClr val="808030"/>
                           </a:solidFill>
@@ -9019,15 +9018,14 @@
                         <a:t>or</a:t>
                       </a:r>
                       <a:r>
-                        <a:rPr lang="en-US" sz="3200" b="0" i="0" u="none" strike="noStrike" dirty="0">
-                          <a:effectLst/>
+                        <a:rPr lang="en-US" sz="3100" noProof="1">
                           <a:latin typeface="Courier New" panose="02070309020205020404" pitchFamily="49" charset="0"/>
                           <a:cs typeface="Courier New" panose="02070309020205020404" pitchFamily="49" charset="0"/>
                         </a:rPr>
                         <a:t> </a:t>
                       </a:r>
                       <a:r>
-                        <a:rPr lang="en-US" sz="3200" b="1" i="0" u="none" strike="noStrike" dirty="0">
+                        <a:rPr lang="en-US" sz="3100" b="1" noProof="1">
                           <a:solidFill>
                             <a:srgbClr val="800000"/>
                           </a:solidFill>
@@ -9038,15 +9036,14 @@
                         <a:t>replace</a:t>
                       </a:r>
                       <a:r>
-                        <a:rPr lang="en-US" sz="3200" b="0" i="0" u="none" strike="noStrike" dirty="0">
-                          <a:effectLst/>
+                        <a:rPr lang="en-US" sz="3100" noProof="1">
                           <a:latin typeface="Courier New" panose="02070309020205020404" pitchFamily="49" charset="0"/>
                           <a:cs typeface="Courier New" panose="02070309020205020404" pitchFamily="49" charset="0"/>
                         </a:rPr>
                         <a:t> </a:t>
                       </a:r>
                       <a:r>
-                        <a:rPr lang="en-US" sz="3200" b="1" i="0" u="none" strike="noStrike" dirty="0">
+                        <a:rPr lang="en-US" sz="3100" b="1" noProof="1">
                           <a:solidFill>
                             <a:srgbClr val="800000"/>
                           </a:solidFill>
@@ -9057,15 +9054,14 @@
                         <a:t>view</a:t>
                       </a:r>
                       <a:r>
-                        <a:rPr lang="en-US" sz="3200" b="0" i="0" u="none" strike="noStrike" dirty="0">
-                          <a:effectLst/>
+                        <a:rPr lang="en-US" sz="3100" noProof="1">
                           <a:latin typeface="Courier New" panose="02070309020205020404" pitchFamily="49" charset="0"/>
                           <a:cs typeface="Courier New" panose="02070309020205020404" pitchFamily="49" charset="0"/>
                         </a:rPr>
                         <a:t> Contact</a:t>
                       </a:r>
                       <a:r>
-                        <a:rPr lang="en-US" sz="3200" b="0" i="0" u="none" strike="noStrike" dirty="0">
+                        <a:rPr lang="en-US" sz="3100" noProof="1">
                           <a:solidFill>
                             <a:srgbClr val="800080"/>
                           </a:solidFill>
@@ -9076,15 +9072,14 @@
                         <a:t>(</a:t>
                       </a:r>
                       <a:r>
-                        <a:rPr lang="en-US" sz="3200" b="0" i="0" u="none" strike="noStrike" dirty="0">
-                          <a:effectLst/>
+                        <a:rPr lang="en-US" sz="3100" noProof="1">
                           <a:latin typeface="Courier New" panose="02070309020205020404" pitchFamily="49" charset="0"/>
                           <a:cs typeface="Courier New" panose="02070309020205020404" pitchFamily="49" charset="0"/>
                         </a:rPr>
-                        <a:t>FirstName</a:t>
+                        <a:t>CustomerEmployeeId</a:t>
                       </a:r>
                       <a:r>
-                        <a:rPr lang="en-US" sz="3200" b="0" i="0" u="none" strike="noStrike" dirty="0">
+                        <a:rPr lang="en-US" sz="3100" noProof="1">
                           <a:solidFill>
                             <a:srgbClr val="800080"/>
                           </a:solidFill>
@@ -9095,15 +9090,14 @@
                         <a:t>,</a:t>
                       </a:r>
                       <a:r>
-                        <a:rPr lang="en-US" sz="3200" b="0" i="0" u="none" strike="noStrike" dirty="0">
-                          <a:effectLst/>
+                        <a:rPr lang="en-US" sz="3100" noProof="1">
                           <a:latin typeface="Courier New" panose="02070309020205020404" pitchFamily="49" charset="0"/>
                           <a:cs typeface="Courier New" panose="02070309020205020404" pitchFamily="49" charset="0"/>
                         </a:rPr>
-                        <a:t> LastName</a:t>
+                        <a:t> Type</a:t>
                       </a:r>
                       <a:r>
-                        <a:rPr lang="en-US" sz="3200" b="0" i="0" u="none" strike="noStrike" dirty="0">
+                        <a:rPr lang="en-US" sz="3100" noProof="1">
                           <a:solidFill>
                             <a:srgbClr val="800080"/>
                           </a:solidFill>
@@ -9114,15 +9108,14 @@
                         <a:t>,</a:t>
                       </a:r>
                       <a:r>
-                        <a:rPr lang="en-US" sz="3200" b="0" i="0" u="none" strike="noStrike" dirty="0">
-                          <a:effectLst/>
+                        <a:rPr lang="en-US" sz="3100" noProof="1">
                           <a:latin typeface="Courier New" panose="02070309020205020404" pitchFamily="49" charset="0"/>
                           <a:cs typeface="Courier New" panose="02070309020205020404" pitchFamily="49" charset="0"/>
                         </a:rPr>
-                        <a:t> Company</a:t>
+                        <a:t> FirstName</a:t>
                       </a:r>
                       <a:r>
-                        <a:rPr lang="en-US" sz="3200" b="0" i="0" u="none" strike="noStrike" dirty="0">
+                        <a:rPr lang="en-US" sz="3100" noProof="1">
                           <a:solidFill>
                             <a:srgbClr val="800080"/>
                           </a:solidFill>
@@ -9133,15 +9126,14 @@
                         <a:t>,</a:t>
                       </a:r>
                       <a:r>
-                        <a:rPr lang="en-US" sz="3200" b="0" i="0" u="none" strike="noStrike" dirty="0">
-                          <a:effectLst/>
+                        <a:rPr lang="en-US" sz="3100" noProof="1">
                           <a:latin typeface="Courier New" panose="02070309020205020404" pitchFamily="49" charset="0"/>
                           <a:cs typeface="Courier New" panose="02070309020205020404" pitchFamily="49" charset="0"/>
                         </a:rPr>
-                        <a:t> Address</a:t>
+                        <a:t> LastName</a:t>
                       </a:r>
                       <a:r>
-                        <a:rPr lang="en-US" sz="3200" b="0" i="0" u="none" strike="noStrike" dirty="0">
+                        <a:rPr lang="en-US" sz="3100" noProof="1">
                           <a:solidFill>
                             <a:srgbClr val="800080"/>
                           </a:solidFill>
@@ -9152,34 +9144,14 @@
                         <a:t>,</a:t>
                       </a:r>
                       <a:r>
-                        <a:rPr lang="en-US" sz="3200" b="0" i="0" u="none" strike="noStrike" dirty="0">
-                          <a:effectLst/>
+                        <a:rPr lang="en-US" sz="3100" noProof="1">
                           <a:latin typeface="Courier New" panose="02070309020205020404" pitchFamily="49" charset="0"/>
                           <a:cs typeface="Courier New" panose="02070309020205020404" pitchFamily="49" charset="0"/>
                         </a:rPr>
-                        <a:t> City</a:t>
+                        <a:t> Company</a:t>
                       </a:r>
                       <a:r>
-                        <a:rPr lang="en-US" sz="3200" b="0" i="0" u="none" strike="noStrike" dirty="0">
-                          <a:solidFill>
-                            <a:srgbClr val="800080"/>
-                          </a:solidFill>
-                          <a:effectLst/>
-                          <a:latin typeface="Courier New" panose="02070309020205020404" pitchFamily="49" charset="0"/>
-                          <a:cs typeface="Courier New" panose="02070309020205020404" pitchFamily="49" charset="0"/>
-                        </a:rPr>
-                        <a:t>, </a:t>
-                      </a:r>
-                      <a:r>
-                        <a:rPr lang="en-US" sz="3200" b="0" i="0" u="none" strike="noStrike" dirty="0">
-                          <a:effectLst/>
-                          <a:latin typeface="Courier New" panose="02070309020205020404" pitchFamily="49" charset="0"/>
-                          <a:cs typeface="Courier New" panose="02070309020205020404" pitchFamily="49" charset="0"/>
-                        </a:rPr>
-                        <a:t>State</a:t>
-                      </a:r>
-                      <a:r>
-                        <a:rPr lang="en-US" sz="3200" b="0" i="0" u="none" strike="noStrike" dirty="0">
+                        <a:rPr lang="en-US" sz="3100" noProof="1">
                           <a:solidFill>
                             <a:srgbClr val="800080"/>
                           </a:solidFill>
@@ -9190,15 +9162,14 @@
                         <a:t>,</a:t>
                       </a:r>
                       <a:r>
-                        <a:rPr lang="en-US" sz="3200" b="0" i="0" u="none" strike="noStrike" dirty="0">
-                          <a:effectLst/>
+                        <a:rPr lang="en-US" sz="3100" noProof="1">
                           <a:latin typeface="Courier New" panose="02070309020205020404" pitchFamily="49" charset="0"/>
                           <a:cs typeface="Courier New" panose="02070309020205020404" pitchFamily="49" charset="0"/>
                         </a:rPr>
-                        <a:t> Country</a:t>
+                        <a:t> Address</a:t>
                       </a:r>
                       <a:r>
-                        <a:rPr lang="en-US" sz="3200" b="0" i="0" u="none" strike="noStrike" dirty="0">
+                        <a:rPr lang="en-US" sz="3100" noProof="1">
                           <a:solidFill>
                             <a:srgbClr val="800080"/>
                           </a:solidFill>
@@ -9209,15 +9180,14 @@
                         <a:t>,</a:t>
                       </a:r>
                       <a:r>
-                        <a:rPr lang="en-US" sz="3200" b="0" i="0" u="none" strike="noStrike" dirty="0">
-                          <a:effectLst/>
+                        <a:rPr lang="en-US" sz="3100" noProof="1">
                           <a:latin typeface="Courier New" panose="02070309020205020404" pitchFamily="49" charset="0"/>
                           <a:cs typeface="Courier New" panose="02070309020205020404" pitchFamily="49" charset="0"/>
                         </a:rPr>
-                        <a:t> PostalCode</a:t>
+                        <a:t> City</a:t>
                       </a:r>
                       <a:r>
-                        <a:rPr lang="en-US" sz="3200" b="0" i="0" u="none" strike="noStrike" dirty="0">
+                        <a:rPr lang="en-US" sz="3100" noProof="1">
                           <a:solidFill>
                             <a:srgbClr val="800080"/>
                           </a:solidFill>
@@ -9228,15 +9198,14 @@
                         <a:t>,</a:t>
                       </a:r>
                       <a:r>
-                        <a:rPr lang="en-US" sz="3200" b="0" i="0" u="none" strike="noStrike" dirty="0">
-                          <a:effectLst/>
+                        <a:rPr lang="en-US" sz="3100" noProof="1">
                           <a:latin typeface="Courier New" panose="02070309020205020404" pitchFamily="49" charset="0"/>
                           <a:cs typeface="Courier New" panose="02070309020205020404" pitchFamily="49" charset="0"/>
                         </a:rPr>
-                        <a:t> Phone</a:t>
+                        <a:t> State</a:t>
                       </a:r>
                       <a:r>
-                        <a:rPr lang="en-US" sz="3200" b="0" i="0" u="none" strike="noStrike" dirty="0">
+                        <a:rPr lang="en-US" sz="3100" noProof="1">
                           <a:solidFill>
                             <a:srgbClr val="800080"/>
                           </a:solidFill>
@@ -9247,15 +9216,14 @@
                         <a:t>,</a:t>
                       </a:r>
                       <a:r>
-                        <a:rPr lang="en-US" sz="3200" b="0" i="0" u="none" strike="noStrike" dirty="0">
-                          <a:effectLst/>
+                        <a:rPr lang="en-US" sz="3100" noProof="1">
                           <a:latin typeface="Courier New" panose="02070309020205020404" pitchFamily="49" charset="0"/>
                           <a:cs typeface="Courier New" panose="02070309020205020404" pitchFamily="49" charset="0"/>
                         </a:rPr>
-                        <a:t> Fax</a:t>
+                        <a:t> Country</a:t>
                       </a:r>
                       <a:r>
-                        <a:rPr lang="en-US" sz="3200" b="0" i="0" u="none" strike="noStrike" dirty="0">
+                        <a:rPr lang="en-US" sz="3100" noProof="1">
                           <a:solidFill>
                             <a:srgbClr val="800080"/>
                           </a:solidFill>
@@ -9266,15 +9234,86 @@
                         <a:t>,</a:t>
                       </a:r>
                       <a:r>
-                        <a:rPr lang="en-US" sz="3200" b="0" i="0" u="none" strike="noStrike" dirty="0">
+                        <a:rPr lang="en-US" sz="3100" noProof="1">
+                          <a:latin typeface="Courier New" panose="02070309020205020404" pitchFamily="49" charset="0"/>
+                          <a:cs typeface="Courier New" panose="02070309020205020404" pitchFamily="49" charset="0"/>
+                        </a:rPr>
+                        <a:t> PostalCode</a:t>
+                      </a:r>
+                      <a:r>
+                        <a:rPr lang="en-US" sz="3100" noProof="1">
+                          <a:solidFill>
+                            <a:srgbClr val="800080"/>
+                          </a:solidFill>
                           <a:effectLst/>
+                          <a:latin typeface="Courier New" panose="02070309020205020404" pitchFamily="49" charset="0"/>
+                          <a:cs typeface="Courier New" panose="02070309020205020404" pitchFamily="49" charset="0"/>
+                        </a:rPr>
+                        <a:t>,</a:t>
+                      </a:r>
+                      <a:r>
+                        <a:rPr lang="en-US" sz="3100" noProof="1">
+                          <a:latin typeface="Courier New" panose="02070309020205020404" pitchFamily="49" charset="0"/>
+                          <a:cs typeface="Courier New" panose="02070309020205020404" pitchFamily="49" charset="0"/>
+                        </a:rPr>
+                        <a:t> Phone</a:t>
+                      </a:r>
+                      <a:r>
+                        <a:rPr lang="en-US" sz="3100" noProof="1">
+                          <a:solidFill>
+                            <a:srgbClr val="800080"/>
+                          </a:solidFill>
+                          <a:effectLst/>
+                          <a:latin typeface="Courier New" panose="02070309020205020404" pitchFamily="49" charset="0"/>
+                          <a:cs typeface="Courier New" panose="02070309020205020404" pitchFamily="49" charset="0"/>
+                        </a:rPr>
+                        <a:t>,</a:t>
+                      </a:r>
+                      <a:r>
+                        <a:rPr lang="en-US" sz="3100" noProof="1">
+                          <a:latin typeface="Courier New" panose="02070309020205020404" pitchFamily="49" charset="0"/>
+                          <a:cs typeface="Courier New" panose="02070309020205020404" pitchFamily="49" charset="0"/>
+                        </a:rPr>
+                        <a:t> Fax</a:t>
+                      </a:r>
+                      <a:r>
+                        <a:rPr lang="en-US" sz="3100" noProof="1">
+                          <a:solidFill>
+                            <a:srgbClr val="800080"/>
+                          </a:solidFill>
+                          <a:effectLst/>
+                          <a:latin typeface="Courier New" panose="02070309020205020404" pitchFamily="49" charset="0"/>
+                          <a:cs typeface="Courier New" panose="02070309020205020404" pitchFamily="49" charset="0"/>
+                        </a:rPr>
+                        <a:t>,</a:t>
+                      </a:r>
+                      <a:r>
+                        <a:rPr lang="en-US" sz="3100" noProof="1">
                           <a:latin typeface="Courier New" panose="02070309020205020404" pitchFamily="49" charset="0"/>
                           <a:cs typeface="Courier New" panose="02070309020205020404" pitchFamily="49" charset="0"/>
                         </a:rPr>
                         <a:t> Email</a:t>
                       </a:r>
                       <a:r>
-                        <a:rPr lang="en-US" sz="3200" b="0" i="0" u="none" strike="noStrike" dirty="0">
+                        <a:rPr lang="en-US" sz="3100" noProof="1">
+                          <a:solidFill>
+                            <a:srgbClr val="800080"/>
+                          </a:solidFill>
+                          <a:effectLst/>
+                          <a:latin typeface="Courier New" panose="02070309020205020404" pitchFamily="49" charset="0"/>
+                          <a:cs typeface="Courier New" panose="02070309020205020404" pitchFamily="49" charset="0"/>
+                        </a:rPr>
+                        <a:t>,</a:t>
+                      </a:r>
+                      <a:r>
+                        <a:rPr lang="en-US" sz="3100" noProof="1">
+                          <a:latin typeface="Courier New" panose="02070309020205020404" pitchFamily="49" charset="0"/>
+                          <a:cs typeface="Courier New" panose="02070309020205020404" pitchFamily="49" charset="0"/>
+                        </a:rPr>
+                        <a:t> EmployeeToReach</a:t>
+                      </a:r>
+                      <a:r>
+                        <a:rPr lang="en-US" sz="3100" noProof="1">
                           <a:solidFill>
                             <a:srgbClr val="800080"/>
                           </a:solidFill>
@@ -9285,15 +9324,14 @@
                         <a:t>)</a:t>
                       </a:r>
                       <a:r>
-                        <a:rPr lang="en-US" sz="3200" b="0" i="0" u="none" strike="noStrike" dirty="0">
-                          <a:effectLst/>
+                        <a:rPr lang="en-US" sz="3100" noProof="1">
                           <a:latin typeface="Courier New" panose="02070309020205020404" pitchFamily="49" charset="0"/>
                           <a:cs typeface="Courier New" panose="02070309020205020404" pitchFamily="49" charset="0"/>
                         </a:rPr>
                         <a:t> </a:t>
                       </a:r>
                       <a:r>
-                        <a:rPr lang="en-US" sz="3200" b="1" i="0" u="none" strike="noStrike" dirty="0">
+                        <a:rPr lang="en-US" sz="3100" b="1" noProof="1">
                           <a:solidFill>
                             <a:srgbClr val="800000"/>
                           </a:solidFill>
@@ -9303,14 +9341,6 @@
                         </a:rPr>
                         <a:t>as</a:t>
                       </a:r>
-                      <a:endParaRPr lang="en-US" sz="3200" b="0" i="0" u="none" strike="noStrike" dirty="0">
-                        <a:solidFill>
-                          <a:srgbClr val="800000"/>
-                        </a:solidFill>
-                        <a:effectLst/>
-                        <a:latin typeface="Courier New" panose="02070309020205020404" pitchFamily="49" charset="0"/>
-                        <a:cs typeface="Courier New" panose="02070309020205020404" pitchFamily="49" charset="0"/>
-                      </a:endParaRPr>
                     </a:p>
                     <a:p>
                       <a:pPr algn="l" fontAlgn="t">
@@ -9322,7 +9352,7 @@
                         </a:spcAft>
                       </a:pPr>
                       <a:r>
-                        <a:rPr lang="en-US" sz="3200" b="0" i="0" u="none" strike="noStrike" dirty="0">
+                        <a:rPr lang="en-US" sz="3100" b="1" noProof="1">
                           <a:solidFill>
                             <a:srgbClr val="800000"/>
                           </a:solidFill>
@@ -9333,7 +9363,7 @@
                         <a:t>    </a:t>
                       </a:r>
                       <a:r>
-                        <a:rPr lang="en-US" sz="3200" b="0" i="0" u="none" strike="noStrike" dirty="0">
+                        <a:rPr lang="en-US" sz="3100" noProof="1">
                           <a:solidFill>
                             <a:srgbClr val="800080"/>
                           </a:solidFill>
@@ -9344,7 +9374,7 @@
                         <a:t>(</a:t>
                       </a:r>
                       <a:r>
-                        <a:rPr lang="en-US" sz="3200" b="1" i="0" u="none" strike="noStrike" dirty="0">
+                        <a:rPr lang="en-US" sz="3100" b="1" noProof="1">
                           <a:solidFill>
                             <a:srgbClr val="800000"/>
                           </a:solidFill>
@@ -9355,15 +9385,14 @@
                         <a:t>select</a:t>
                       </a:r>
                       <a:r>
-                        <a:rPr lang="en-US" sz="3200" b="0" i="0" u="none" strike="noStrike" dirty="0">
-                          <a:effectLst/>
+                        <a:rPr lang="en-US" sz="3100" noProof="1">
                           <a:latin typeface="Courier New" panose="02070309020205020404" pitchFamily="49" charset="0"/>
                           <a:cs typeface="Courier New" panose="02070309020205020404" pitchFamily="49" charset="0"/>
                         </a:rPr>
-                        <a:t> FirstName</a:t>
+                        <a:t> CustomerId</a:t>
                       </a:r>
                       <a:r>
-                        <a:rPr lang="en-US" sz="3200" b="0" i="0" u="none" strike="noStrike" dirty="0">
+                        <a:rPr lang="en-US" sz="3100" noProof="1">
                           <a:solidFill>
                             <a:srgbClr val="800080"/>
                           </a:solidFill>
@@ -9374,15 +9403,25 @@
                         <a:t>,</a:t>
                       </a:r>
                       <a:r>
-                        <a:rPr lang="en-US" sz="3200" b="0" i="0" u="none" strike="noStrike" dirty="0">
+                        <a:rPr lang="en-US" sz="3100" noProof="1">
+                          <a:latin typeface="Courier New" panose="02070309020205020404" pitchFamily="49" charset="0"/>
+                          <a:cs typeface="Courier New" panose="02070309020205020404" pitchFamily="49" charset="0"/>
+                        </a:rPr>
+                        <a:t> </a:t>
+                      </a:r>
+                      <a:r>
+                        <a:rPr lang="en-US" sz="3100" noProof="1">
+                          <a:solidFill>
+                            <a:srgbClr val="0000E6"/>
+                          </a:solidFill>
                           <a:effectLst/>
                           <a:latin typeface="Courier New" panose="02070309020205020404" pitchFamily="49" charset="0"/>
                           <a:cs typeface="Courier New" panose="02070309020205020404" pitchFamily="49" charset="0"/>
                         </a:rPr>
-                        <a:t> LastName</a:t>
+                        <a:t>'Customer'</a:t>
                       </a:r>
                       <a:r>
-                        <a:rPr lang="en-US" sz="3200" b="0" i="0" u="none" strike="noStrike" dirty="0">
+                        <a:rPr lang="en-US" sz="3100" noProof="1">
                           <a:solidFill>
                             <a:srgbClr val="800080"/>
                           </a:solidFill>
@@ -9393,15 +9432,14 @@
                         <a:t>,</a:t>
                       </a:r>
                       <a:r>
-                        <a:rPr lang="en-US" sz="3200" b="0" i="0" u="none" strike="noStrike" dirty="0">
-                          <a:effectLst/>
+                        <a:rPr lang="en-US" sz="3100" noProof="1">
                           <a:latin typeface="Courier New" panose="02070309020205020404" pitchFamily="49" charset="0"/>
                           <a:cs typeface="Courier New" panose="02070309020205020404" pitchFamily="49" charset="0"/>
                         </a:rPr>
-                        <a:t> Company</a:t>
+                        <a:t> FirstName</a:t>
                       </a:r>
                       <a:r>
-                        <a:rPr lang="en-US" sz="3200" b="0" i="0" u="none" strike="noStrike" dirty="0">
+                        <a:rPr lang="en-US" sz="3100" noProof="1">
                           <a:solidFill>
                             <a:srgbClr val="800080"/>
                           </a:solidFill>
@@ -9412,15 +9450,14 @@
                         <a:t>,</a:t>
                       </a:r>
                       <a:r>
-                        <a:rPr lang="en-US" sz="3200" b="0" i="0" u="none" strike="noStrike" dirty="0">
-                          <a:effectLst/>
+                        <a:rPr lang="en-US" sz="3100" noProof="1">
                           <a:latin typeface="Courier New" panose="02070309020205020404" pitchFamily="49" charset="0"/>
                           <a:cs typeface="Courier New" panose="02070309020205020404" pitchFamily="49" charset="0"/>
                         </a:rPr>
-                        <a:t> Address</a:t>
+                        <a:t> LastName</a:t>
                       </a:r>
                       <a:r>
-                        <a:rPr lang="en-US" sz="3200" b="0" i="0" u="none" strike="noStrike" dirty="0">
+                        <a:rPr lang="en-US" sz="3100" noProof="1">
                           <a:solidFill>
                             <a:srgbClr val="800080"/>
                           </a:solidFill>
@@ -9431,15 +9468,32 @@
                         <a:t>,</a:t>
                       </a:r>
                       <a:r>
-                        <a:rPr lang="en-US" sz="3200" b="0" i="0" u="none" strike="noStrike" dirty="0">
+                        <a:rPr lang="en-US" sz="3100" noProof="1">
+                          <a:latin typeface="Courier New" panose="02070309020205020404" pitchFamily="49" charset="0"/>
+                          <a:cs typeface="Courier New" panose="02070309020205020404" pitchFamily="49" charset="0"/>
+                        </a:rPr>
+                        <a:t> Company</a:t>
+                      </a:r>
+                      <a:r>
+                        <a:rPr lang="en-US" sz="3100" noProof="1">
+                          <a:solidFill>
+                            <a:srgbClr val="800080"/>
+                          </a:solidFill>
                           <a:effectLst/>
                           <a:latin typeface="Courier New" panose="02070309020205020404" pitchFamily="49" charset="0"/>
                           <a:cs typeface="Courier New" panose="02070309020205020404" pitchFamily="49" charset="0"/>
                         </a:rPr>
-                        <a:t> City</a:t>
+                        <a:t>,</a:t>
                       </a:r>
                       <a:r>
-                        <a:rPr lang="en-US" sz="3200" b="0" i="0" u="none" strike="noStrike" dirty="0">
+                        <a:rPr lang="en-US" sz="3100" noProof="1">
+                          <a:latin typeface="Courier New" panose="02070309020205020404" pitchFamily="49" charset="0"/>
+                          <a:cs typeface="Courier New" panose="02070309020205020404" pitchFamily="49" charset="0"/>
+                        </a:rPr>
+                        <a:t> Address</a:t>
+                      </a:r>
+                      <a:r>
+                        <a:rPr lang="en-US" sz="3100" noProof="1">
                           <a:solidFill>
                             <a:srgbClr val="800080"/>
                           </a:solidFill>
@@ -9460,26 +9514,14 @@
                         </a:spcAft>
                       </a:pPr>
                       <a:r>
-                        <a:rPr lang="en-US" sz="3200" b="0" i="0" u="none" strike="noStrike" dirty="0">
-                          <a:solidFill>
-                            <a:srgbClr val="800080"/>
-                          </a:solidFill>
-                          <a:effectLst/>
+                        <a:rPr lang="en-US" sz="3100" noProof="1">
                           <a:latin typeface="Courier New" panose="02070309020205020404" pitchFamily="49" charset="0"/>
                           <a:cs typeface="Courier New" panose="02070309020205020404" pitchFamily="49" charset="0"/>
                         </a:rPr>
-                        <a:t>     </a:t>
+                        <a:t>     City</a:t>
                       </a:r>
                       <a:r>
-                        <a:rPr lang="en-US" sz="3200" b="0" i="0" u="none" strike="noStrike" dirty="0">
-                          <a:effectLst/>
-                          <a:latin typeface="Courier New" panose="02070309020205020404" pitchFamily="49" charset="0"/>
-                          <a:cs typeface="Courier New" panose="02070309020205020404" pitchFamily="49" charset="0"/>
-                        </a:rPr>
-                        <a:t>State</a:t>
-                      </a:r>
-                      <a:r>
-                        <a:rPr lang="en-US" sz="3200" b="0" i="0" u="none" strike="noStrike" dirty="0">
+                        <a:rPr lang="en-US" sz="3100" noProof="1">
                           <a:solidFill>
                             <a:srgbClr val="800080"/>
                           </a:solidFill>
@@ -9490,15 +9532,14 @@
                         <a:t>,</a:t>
                       </a:r>
                       <a:r>
-                        <a:rPr lang="en-US" sz="3200" b="0" i="0" u="none" strike="noStrike" dirty="0">
-                          <a:effectLst/>
+                        <a:rPr lang="en-US" sz="3100" noProof="1">
                           <a:latin typeface="Courier New" panose="02070309020205020404" pitchFamily="49" charset="0"/>
                           <a:cs typeface="Courier New" panose="02070309020205020404" pitchFamily="49" charset="0"/>
                         </a:rPr>
-                        <a:t> Country</a:t>
+                        <a:t> State</a:t>
                       </a:r>
                       <a:r>
-                        <a:rPr lang="en-US" sz="3200" b="0" i="0" u="none" strike="noStrike" dirty="0">
+                        <a:rPr lang="en-US" sz="3100" noProof="1">
                           <a:solidFill>
                             <a:srgbClr val="800080"/>
                           </a:solidFill>
@@ -9509,15 +9550,14 @@
                         <a:t>, </a:t>
                       </a:r>
                       <a:r>
-                        <a:rPr lang="en-US" sz="3200" b="0" i="0" u="none" strike="noStrike" dirty="0">
-                          <a:effectLst/>
+                        <a:rPr lang="en-US" sz="3100" noProof="1">
                           <a:latin typeface="Courier New" panose="02070309020205020404" pitchFamily="49" charset="0"/>
                           <a:cs typeface="Courier New" panose="02070309020205020404" pitchFamily="49" charset="0"/>
                         </a:rPr>
-                        <a:t>PostalCode</a:t>
+                        <a:t>Country</a:t>
                       </a:r>
                       <a:r>
-                        <a:rPr lang="en-US" sz="3200" b="0" i="0" u="none" strike="noStrike" dirty="0">
+                        <a:rPr lang="en-US" sz="3100" noProof="1">
                           <a:solidFill>
                             <a:srgbClr val="800080"/>
                           </a:solidFill>
@@ -9528,15 +9568,14 @@
                         <a:t>,</a:t>
                       </a:r>
                       <a:r>
-                        <a:rPr lang="en-US" sz="3200" b="0" i="0" u="none" strike="noStrike" dirty="0">
-                          <a:effectLst/>
+                        <a:rPr lang="en-US" sz="3100" noProof="1">
                           <a:latin typeface="Courier New" panose="02070309020205020404" pitchFamily="49" charset="0"/>
                           <a:cs typeface="Courier New" panose="02070309020205020404" pitchFamily="49" charset="0"/>
                         </a:rPr>
-                        <a:t> Phone</a:t>
+                        <a:t> PostalCode</a:t>
                       </a:r>
                       <a:r>
-                        <a:rPr lang="en-US" sz="3200" b="0" i="0" u="none" strike="noStrike" dirty="0">
+                        <a:rPr lang="en-US" sz="3100" noProof="1">
                           <a:solidFill>
                             <a:srgbClr val="800080"/>
                           </a:solidFill>
@@ -9547,15 +9586,14 @@
                         <a:t>,</a:t>
                       </a:r>
                       <a:r>
-                        <a:rPr lang="en-US" sz="3200" b="0" i="0" u="none" strike="noStrike" dirty="0">
-                          <a:effectLst/>
+                        <a:rPr lang="en-US" sz="3100" noProof="1">
                           <a:latin typeface="Courier New" panose="02070309020205020404" pitchFamily="49" charset="0"/>
                           <a:cs typeface="Courier New" panose="02070309020205020404" pitchFamily="49" charset="0"/>
                         </a:rPr>
-                        <a:t> Fax</a:t>
+                        <a:t> Phone</a:t>
                       </a:r>
                       <a:r>
-                        <a:rPr lang="en-US" sz="3200" b="0" i="0" u="none" strike="noStrike" dirty="0">
+                        <a:rPr lang="en-US" sz="3100" noProof="1">
                           <a:solidFill>
                             <a:srgbClr val="800080"/>
                           </a:solidFill>
@@ -9566,15 +9604,50 @@
                         <a:t>,</a:t>
                       </a:r>
                       <a:r>
-                        <a:rPr lang="en-US" sz="3200" b="0" i="0" u="none" strike="noStrike" dirty="0">
+                        <a:rPr lang="en-US" sz="3100" noProof="1">
+                          <a:latin typeface="Courier New" panose="02070309020205020404" pitchFamily="49" charset="0"/>
+                          <a:cs typeface="Courier New" panose="02070309020205020404" pitchFamily="49" charset="0"/>
+                        </a:rPr>
+                        <a:t> Fax</a:t>
+                      </a:r>
+                      <a:r>
+                        <a:rPr lang="en-US" sz="3100" noProof="1">
+                          <a:solidFill>
+                            <a:srgbClr val="800080"/>
+                          </a:solidFill>
                           <a:effectLst/>
                           <a:latin typeface="Courier New" panose="02070309020205020404" pitchFamily="49" charset="0"/>
                           <a:cs typeface="Courier New" panose="02070309020205020404" pitchFamily="49" charset="0"/>
                         </a:rPr>
-                        <a:t> Email </a:t>
+                        <a:t>,</a:t>
                       </a:r>
                       <a:r>
-                        <a:rPr lang="en-US" sz="3200" b="1" i="0" u="none" strike="noStrike" dirty="0">
+                        <a:rPr lang="en-US" sz="3100" noProof="1">
+                          <a:latin typeface="Courier New" panose="02070309020205020404" pitchFamily="49" charset="0"/>
+                          <a:cs typeface="Courier New" panose="02070309020205020404" pitchFamily="49" charset="0"/>
+                        </a:rPr>
+                        <a:t> Email</a:t>
+                      </a:r>
+                      <a:r>
+                        <a:rPr lang="en-US" sz="3100" noProof="1">
+                          <a:solidFill>
+                            <a:srgbClr val="800080"/>
+                          </a:solidFill>
+                          <a:effectLst/>
+                          <a:latin typeface="Courier New" panose="02070309020205020404" pitchFamily="49" charset="0"/>
+                          <a:cs typeface="Courier New" panose="02070309020205020404" pitchFamily="49" charset="0"/>
+                        </a:rPr>
+                        <a:t>,</a:t>
+                      </a:r>
+                      <a:r>
+                        <a:rPr lang="en-US" sz="3100" noProof="1">
+                          <a:latin typeface="Courier New" panose="02070309020205020404" pitchFamily="49" charset="0"/>
+                          <a:cs typeface="Courier New" panose="02070309020205020404" pitchFamily="49" charset="0"/>
+                        </a:rPr>
+                        <a:t> SupportRepId </a:t>
+                      </a:r>
+                      <a:r>
+                        <a:rPr lang="en-US" sz="3100" b="1" noProof="1">
                           <a:solidFill>
                             <a:srgbClr val="800000"/>
                           </a:solidFill>
@@ -9585,15 +9658,14 @@
                         <a:t>from</a:t>
                       </a:r>
                       <a:r>
-                        <a:rPr lang="en-US" sz="3200" b="0" i="0" u="none" strike="noStrike" dirty="0">
-                          <a:effectLst/>
+                        <a:rPr lang="en-US" sz="3100" noProof="1">
                           <a:latin typeface="Courier New" panose="02070309020205020404" pitchFamily="49" charset="0"/>
                           <a:cs typeface="Courier New" panose="02070309020205020404" pitchFamily="49" charset="0"/>
                         </a:rPr>
                         <a:t> Customer</a:t>
                       </a:r>
                       <a:r>
-                        <a:rPr lang="en-US" sz="3200" b="0" i="0" u="none" strike="noStrike" dirty="0">
+                        <a:rPr lang="en-US" sz="3100" noProof="1">
                           <a:solidFill>
                             <a:srgbClr val="800080"/>
                           </a:solidFill>
@@ -9614,7 +9686,7 @@
                         </a:spcAft>
                       </a:pPr>
                       <a:r>
-                        <a:rPr lang="en-US" sz="3200" b="0" i="0" u="none" strike="noStrike" dirty="0">
+                        <a:rPr lang="en-US" sz="3100" b="1" noProof="1">
                           <a:solidFill>
                             <a:srgbClr val="800080"/>
                           </a:solidFill>
@@ -9622,10 +9694,10 @@
                           <a:latin typeface="Courier New" panose="02070309020205020404" pitchFamily="49" charset="0"/>
                           <a:cs typeface="Courier New" panose="02070309020205020404" pitchFamily="49" charset="0"/>
                         </a:rPr>
-                        <a:t>    </a:t>
+                        <a:t>     </a:t>
                       </a:r>
                       <a:r>
-                        <a:rPr lang="en-US" sz="3200" b="1" i="0" u="none" strike="noStrike" dirty="0">
+                        <a:rPr lang="en-US" sz="3100" b="1" noProof="1">
                           <a:solidFill>
                             <a:srgbClr val="800000"/>
                           </a:solidFill>
@@ -9635,14 +9707,6 @@
                         </a:rPr>
                         <a:t>union</a:t>
                       </a:r>
-                      <a:endParaRPr lang="en-US" sz="3200" b="0" i="0" u="none" strike="noStrike" dirty="0">
-                        <a:solidFill>
-                          <a:srgbClr val="800000"/>
-                        </a:solidFill>
-                        <a:effectLst/>
-                        <a:latin typeface="Courier New" panose="02070309020205020404" pitchFamily="49" charset="0"/>
-                        <a:cs typeface="Courier New" panose="02070309020205020404" pitchFamily="49" charset="0"/>
-                      </a:endParaRPr>
                     </a:p>
                     <a:p>
                       <a:pPr algn="l" fontAlgn="t">
@@ -9654,7 +9718,7 @@
                         </a:spcAft>
                       </a:pPr>
                       <a:r>
-                        <a:rPr lang="en-US" sz="3200" b="0" i="0" u="none" strike="noStrike" dirty="0">
+                        <a:rPr lang="en-US" sz="3100" b="1" noProof="1">
                           <a:solidFill>
                             <a:srgbClr val="800000"/>
                           </a:solidFill>
@@ -9665,7 +9729,7 @@
                         <a:t>    </a:t>
                       </a:r>
                       <a:r>
-                        <a:rPr lang="en-US" sz="3200" b="0" i="0" u="none" strike="noStrike" dirty="0">
+                        <a:rPr lang="en-US" sz="3100" noProof="1">
                           <a:solidFill>
                             <a:srgbClr val="800080"/>
                           </a:solidFill>
@@ -9676,7 +9740,7 @@
                         <a:t>(</a:t>
                       </a:r>
                       <a:r>
-                        <a:rPr lang="en-US" sz="3200" b="1" i="0" u="none" strike="noStrike" dirty="0">
+                        <a:rPr lang="en-US" sz="3100" b="1" noProof="1">
                           <a:solidFill>
                             <a:srgbClr val="800000"/>
                           </a:solidFill>
@@ -9687,15 +9751,14 @@
                         <a:t>select</a:t>
                       </a:r>
                       <a:r>
-                        <a:rPr lang="en-US" sz="3200" b="0" i="0" u="none" strike="noStrike" dirty="0">
-                          <a:effectLst/>
+                        <a:rPr lang="en-US" sz="3100" noProof="1">
                           <a:latin typeface="Courier New" panose="02070309020205020404" pitchFamily="49" charset="0"/>
                           <a:cs typeface="Courier New" panose="02070309020205020404" pitchFamily="49" charset="0"/>
                         </a:rPr>
-                        <a:t> FirstName</a:t>
+                        <a:t> EmployeeId</a:t>
                       </a:r>
                       <a:r>
-                        <a:rPr lang="en-US" sz="3200" b="0" i="0" u="none" strike="noStrike" dirty="0">
+                        <a:rPr lang="en-US" sz="3100" noProof="1">
                           <a:solidFill>
                             <a:srgbClr val="800080"/>
                           </a:solidFill>
@@ -9706,15 +9769,25 @@
                         <a:t>,</a:t>
                       </a:r>
                       <a:r>
-                        <a:rPr lang="en-US" sz="3200" b="0" i="0" u="none" strike="noStrike" dirty="0">
+                        <a:rPr lang="en-US" sz="3100" noProof="1">
+                          <a:latin typeface="Courier New" panose="02070309020205020404" pitchFamily="49" charset="0"/>
+                          <a:cs typeface="Courier New" panose="02070309020205020404" pitchFamily="49" charset="0"/>
+                        </a:rPr>
+                        <a:t> </a:t>
+                      </a:r>
+                      <a:r>
+                        <a:rPr lang="en-US" sz="3100" noProof="1">
+                          <a:solidFill>
+                            <a:srgbClr val="0000E6"/>
+                          </a:solidFill>
                           <a:effectLst/>
                           <a:latin typeface="Courier New" panose="02070309020205020404" pitchFamily="49" charset="0"/>
                           <a:cs typeface="Courier New" panose="02070309020205020404" pitchFamily="49" charset="0"/>
                         </a:rPr>
-                        <a:t> LastName</a:t>
+                        <a:t>'Employee'</a:t>
                       </a:r>
                       <a:r>
-                        <a:rPr lang="en-US" sz="3200" b="0" i="0" u="none" strike="noStrike" dirty="0">
+                        <a:rPr lang="en-US" sz="3100" noProof="1">
                           <a:solidFill>
                             <a:srgbClr val="800080"/>
                           </a:solidFill>
@@ -9725,26 +9798,14 @@
                         <a:t>,</a:t>
                       </a:r>
                       <a:r>
-                        <a:rPr lang="en-US" sz="3200" b="0" i="0" u="none" strike="noStrike" dirty="0">
-                          <a:effectLst/>
+                        <a:rPr lang="en-US" sz="3100" noProof="1">
                           <a:latin typeface="Courier New" panose="02070309020205020404" pitchFamily="49" charset="0"/>
                           <a:cs typeface="Courier New" panose="02070309020205020404" pitchFamily="49" charset="0"/>
                         </a:rPr>
-                        <a:t> </a:t>
+                        <a:t> FirstName</a:t>
                       </a:r>
                       <a:r>
-                        <a:rPr lang="en-US" sz="3200" b="0" i="0" u="none" strike="noStrike" dirty="0">
-                          <a:solidFill>
-                            <a:srgbClr val="0000E6"/>
-                          </a:solidFill>
-                          <a:effectLst/>
-                          <a:latin typeface="Courier New" panose="02070309020205020404" pitchFamily="49" charset="0"/>
-                          <a:cs typeface="Courier New" panose="02070309020205020404" pitchFamily="49" charset="0"/>
-                        </a:rPr>
-                        <a:t>"Chinook Corporation"</a:t>
-                      </a:r>
-                      <a:r>
-                        <a:rPr lang="en-US" sz="3200" b="0" i="0" u="none" strike="noStrike" dirty="0">
+                        <a:rPr lang="en-US" sz="3100" noProof="1">
                           <a:solidFill>
                             <a:srgbClr val="800080"/>
                           </a:solidFill>
@@ -9755,15 +9816,14 @@
                         <a:t>,</a:t>
                       </a:r>
                       <a:r>
-                        <a:rPr lang="en-US" sz="3200" b="0" i="0" u="none" strike="noStrike" dirty="0">
-                          <a:effectLst/>
+                        <a:rPr lang="en-US" sz="3100" noProof="1">
                           <a:latin typeface="Courier New" panose="02070309020205020404" pitchFamily="49" charset="0"/>
                           <a:cs typeface="Courier New" panose="02070309020205020404" pitchFamily="49" charset="0"/>
                         </a:rPr>
-                        <a:t> Address</a:t>
+                        <a:t> LastName</a:t>
                       </a:r>
                       <a:r>
-                        <a:rPr lang="en-US" sz="3200" b="0" i="0" u="none" strike="noStrike" dirty="0">
+                        <a:rPr lang="en-US" sz="3100" noProof="1">
                           <a:solidFill>
                             <a:srgbClr val="800080"/>
                           </a:solidFill>
@@ -9774,21 +9834,52 @@
                         <a:t>,</a:t>
                       </a:r>
                       <a:r>
-                        <a:rPr lang="en-US" sz="3200" b="0" i="0" u="none" strike="noStrike" dirty="0">
+                        <a:rPr lang="en-US" sz="3100" noProof="1">
+                          <a:latin typeface="Courier New" panose="02070309020205020404" pitchFamily="49" charset="0"/>
+                          <a:cs typeface="Courier New" panose="02070309020205020404" pitchFamily="49" charset="0"/>
+                        </a:rPr>
+                        <a:t> </a:t>
+                      </a:r>
+                      <a:r>
+                        <a:rPr lang="en-US" sz="3100" noProof="1">
+                          <a:solidFill>
+                            <a:srgbClr val="0000E6"/>
+                          </a:solidFill>
                           <a:effectLst/>
                           <a:latin typeface="Courier New" panose="02070309020205020404" pitchFamily="49" charset="0"/>
                           <a:cs typeface="Courier New" panose="02070309020205020404" pitchFamily="49" charset="0"/>
                         </a:rPr>
-                        <a:t> City,</a:t>
+                        <a:t>'Chinook Corporation'</a:t>
                       </a:r>
-                      <a:endParaRPr lang="en-US" sz="3200" b="0" i="0" u="none" strike="noStrike" dirty="0">
-                        <a:solidFill>
-                          <a:srgbClr val="800080"/>
-                        </a:solidFill>
-                        <a:effectLst/>
-                        <a:latin typeface="Courier New" panose="02070309020205020404" pitchFamily="49" charset="0"/>
-                        <a:cs typeface="Courier New" panose="02070309020205020404" pitchFamily="49" charset="0"/>
-                      </a:endParaRPr>
+                      <a:r>
+                        <a:rPr lang="en-US" sz="3100" noProof="1">
+                          <a:solidFill>
+                            <a:srgbClr val="800080"/>
+                          </a:solidFill>
+                          <a:effectLst/>
+                          <a:latin typeface="Courier New" panose="02070309020205020404" pitchFamily="49" charset="0"/>
+                          <a:cs typeface="Courier New" panose="02070309020205020404" pitchFamily="49" charset="0"/>
+                        </a:rPr>
+                        <a:t>,</a:t>
+                      </a:r>
+                      <a:r>
+                        <a:rPr lang="en-US" sz="3100" noProof="1">
+                          <a:latin typeface="Courier New" panose="02070309020205020404" pitchFamily="49" charset="0"/>
+                          <a:cs typeface="Courier New" panose="02070309020205020404" pitchFamily="49" charset="0"/>
+                        </a:rPr>
+                        <a:t> Address</a:t>
+                      </a:r>
+                      <a:r>
+                        <a:rPr lang="en-US" sz="3100" noProof="1">
+                          <a:solidFill>
+                            <a:srgbClr val="800080"/>
+                          </a:solidFill>
+                          <a:effectLst/>
+                          <a:latin typeface="Courier New" panose="02070309020205020404" pitchFamily="49" charset="0"/>
+                          <a:cs typeface="Courier New" panose="02070309020205020404" pitchFamily="49" charset="0"/>
+                        </a:rPr>
+                        <a:t>,</a:t>
+                      </a:r>
                     </a:p>
                     <a:p>
                       <a:pPr algn="l" fontAlgn="t">
@@ -9800,7 +9891,7 @@
                         </a:spcAft>
                       </a:pPr>
                       <a:r>
-                        <a:rPr lang="en-US" sz="3200" b="0" i="0" u="none" strike="noStrike" dirty="0">
+                        <a:rPr lang="en-US" sz="3100" noProof="1">
                           <a:solidFill>
                             <a:srgbClr val="800080"/>
                           </a:solidFill>
@@ -9808,18 +9899,17 @@
                           <a:latin typeface="Courier New" panose="02070309020205020404" pitchFamily="49" charset="0"/>
                           <a:cs typeface="Courier New" panose="02070309020205020404" pitchFamily="49" charset="0"/>
                         </a:rPr>
-                        <a:t>    </a:t>
+                        <a:t>     </a:t>
                       </a:r>
                       <a:r>
-                        <a:rPr lang="en-US" sz="3200" b="0" i="0" u="none" strike="noStrike" dirty="0">
-                          <a:effectLst/>
+                        <a:rPr lang="en-US" sz="3100" noProof="1">
                           <a:latin typeface="Courier New" panose="02070309020205020404" pitchFamily="49" charset="0"/>
                           <a:cs typeface="Courier New" panose="02070309020205020404" pitchFamily="49" charset="0"/>
                         </a:rPr>
-                        <a:t> State</a:t>
+                        <a:t>City</a:t>
                       </a:r>
                       <a:r>
-                        <a:rPr lang="en-US" sz="3200" b="0" i="0" u="none" strike="noStrike" dirty="0">
+                        <a:rPr lang="en-US" sz="3100" noProof="1">
                           <a:solidFill>
                             <a:srgbClr val="800080"/>
                           </a:solidFill>
@@ -9830,15 +9920,14 @@
                         <a:t>,</a:t>
                       </a:r>
                       <a:r>
-                        <a:rPr lang="en-US" sz="3200" b="0" i="0" u="none" strike="noStrike" dirty="0">
-                          <a:effectLst/>
+                        <a:rPr lang="en-US" sz="3100" noProof="1">
                           <a:latin typeface="Courier New" panose="02070309020205020404" pitchFamily="49" charset="0"/>
                           <a:cs typeface="Courier New" panose="02070309020205020404" pitchFamily="49" charset="0"/>
                         </a:rPr>
-                        <a:t> Country</a:t>
+                        <a:t> State</a:t>
                       </a:r>
                       <a:r>
-                        <a:rPr lang="en-US" sz="3200" b="0" i="0" u="none" strike="noStrike" dirty="0">
+                        <a:rPr lang="en-US" sz="3100" noProof="1">
                           <a:solidFill>
                             <a:srgbClr val="800080"/>
                           </a:solidFill>
@@ -9849,15 +9938,14 @@
                         <a:t>,</a:t>
                       </a:r>
                       <a:r>
-                        <a:rPr lang="en-US" sz="3200" b="0" i="0" u="none" strike="noStrike" dirty="0">
-                          <a:effectLst/>
+                        <a:rPr lang="en-US" sz="3100" noProof="1">
                           <a:latin typeface="Courier New" panose="02070309020205020404" pitchFamily="49" charset="0"/>
                           <a:cs typeface="Courier New" panose="02070309020205020404" pitchFamily="49" charset="0"/>
                         </a:rPr>
-                        <a:t> PostalCode</a:t>
+                        <a:t> Country</a:t>
                       </a:r>
                       <a:r>
-                        <a:rPr lang="en-US" sz="3200" b="0" i="0" u="none" strike="noStrike" dirty="0">
+                        <a:rPr lang="en-US" sz="3100" noProof="1">
                           <a:solidFill>
                             <a:srgbClr val="800080"/>
                           </a:solidFill>
@@ -9868,15 +9956,14 @@
                         <a:t>,</a:t>
                       </a:r>
                       <a:r>
-                        <a:rPr lang="en-US" sz="3200" b="0" i="0" u="none" strike="noStrike" dirty="0">
-                          <a:effectLst/>
+                        <a:rPr lang="en-US" sz="3100" noProof="1">
                           <a:latin typeface="Courier New" panose="02070309020205020404" pitchFamily="49" charset="0"/>
                           <a:cs typeface="Courier New" panose="02070309020205020404" pitchFamily="49" charset="0"/>
                         </a:rPr>
-                        <a:t> Phone</a:t>
+                        <a:t> PostalCode</a:t>
                       </a:r>
                       <a:r>
-                        <a:rPr lang="en-US" sz="3200" b="0" i="0" u="none" strike="noStrike" dirty="0">
+                        <a:rPr lang="en-US" sz="3100" noProof="1">
                           <a:solidFill>
                             <a:srgbClr val="800080"/>
                           </a:solidFill>
@@ -9887,15 +9974,14 @@
                         <a:t>,</a:t>
                       </a:r>
                       <a:r>
-                        <a:rPr lang="en-US" sz="3200" b="0" i="0" u="none" strike="noStrike" dirty="0">
-                          <a:effectLst/>
+                        <a:rPr lang="en-US" sz="3100" noProof="1">
                           <a:latin typeface="Courier New" panose="02070309020205020404" pitchFamily="49" charset="0"/>
                           <a:cs typeface="Courier New" panose="02070309020205020404" pitchFamily="49" charset="0"/>
                         </a:rPr>
-                        <a:t> Fax</a:t>
+                        <a:t> Phone</a:t>
                       </a:r>
                       <a:r>
-                        <a:rPr lang="en-US" sz="3200" b="0" i="0" u="none" strike="noStrike" dirty="0">
+                        <a:rPr lang="en-US" sz="3100" noProof="1">
                           <a:solidFill>
                             <a:srgbClr val="800080"/>
                           </a:solidFill>
@@ -9906,15 +9992,50 @@
                         <a:t>,</a:t>
                       </a:r>
                       <a:r>
-                        <a:rPr lang="en-US" sz="3200" b="0" i="0" u="none" strike="noStrike" dirty="0">
+                        <a:rPr lang="en-US" sz="3100" noProof="1">
+                          <a:latin typeface="Courier New" panose="02070309020205020404" pitchFamily="49" charset="0"/>
+                          <a:cs typeface="Courier New" panose="02070309020205020404" pitchFamily="49" charset="0"/>
+                        </a:rPr>
+                        <a:t> Fax</a:t>
+                      </a:r>
+                      <a:r>
+                        <a:rPr lang="en-US" sz="3100" noProof="1">
+                          <a:solidFill>
+                            <a:srgbClr val="800080"/>
+                          </a:solidFill>
                           <a:effectLst/>
                           <a:latin typeface="Courier New" panose="02070309020205020404" pitchFamily="49" charset="0"/>
                           <a:cs typeface="Courier New" panose="02070309020205020404" pitchFamily="49" charset="0"/>
                         </a:rPr>
-                        <a:t> Email </a:t>
+                        <a:t>,</a:t>
                       </a:r>
                       <a:r>
-                        <a:rPr lang="en-US" sz="3200" b="1" i="0" u="none" strike="noStrike" dirty="0">
+                        <a:rPr lang="en-US" sz="3100" noProof="1">
+                          <a:latin typeface="Courier New" panose="02070309020205020404" pitchFamily="49" charset="0"/>
+                          <a:cs typeface="Courier New" panose="02070309020205020404" pitchFamily="49" charset="0"/>
+                        </a:rPr>
+                        <a:t> Email</a:t>
+                      </a:r>
+                      <a:r>
+                        <a:rPr lang="en-US" sz="3100" noProof="1">
+                          <a:solidFill>
+                            <a:srgbClr val="800080"/>
+                          </a:solidFill>
+                          <a:effectLst/>
+                          <a:latin typeface="Courier New" panose="02070309020205020404" pitchFamily="49" charset="0"/>
+                          <a:cs typeface="Courier New" panose="02070309020205020404" pitchFamily="49" charset="0"/>
+                        </a:rPr>
+                        <a:t>,</a:t>
+                      </a:r>
+                      <a:r>
+                        <a:rPr lang="en-US" sz="3100" noProof="1">
+                          <a:latin typeface="Courier New" panose="02070309020205020404" pitchFamily="49" charset="0"/>
+                          <a:cs typeface="Courier New" panose="02070309020205020404" pitchFamily="49" charset="0"/>
+                        </a:rPr>
+                        <a:t> ReportsTo </a:t>
+                      </a:r>
+                      <a:r>
+                        <a:rPr lang="en-US" sz="3100" b="1" noProof="1">
                           <a:solidFill>
                             <a:srgbClr val="800000"/>
                           </a:solidFill>
@@ -9925,15 +10046,14 @@
                         <a:t>from</a:t>
                       </a:r>
                       <a:r>
-                        <a:rPr lang="en-US" sz="3200" b="0" i="0" u="none" strike="noStrike" dirty="0">
-                          <a:effectLst/>
+                        <a:rPr lang="en-US" sz="3100" noProof="1">
                           <a:latin typeface="Courier New" panose="02070309020205020404" pitchFamily="49" charset="0"/>
                           <a:cs typeface="Courier New" panose="02070309020205020404" pitchFamily="49" charset="0"/>
                         </a:rPr>
                         <a:t> Employee</a:t>
                       </a:r>
                       <a:r>
-                        <a:rPr lang="en-US" sz="3200" b="0" i="0" u="none" strike="noStrike" dirty="0">
+                        <a:rPr lang="en-US" sz="3100" noProof="1">
                           <a:solidFill>
                             <a:srgbClr val="800080"/>
                           </a:solidFill>
@@ -9943,7 +10063,14 @@
                         </a:rPr>
                         <a:t>);</a:t>
                       </a:r>
-                      <a:endParaRPr lang="en-US" sz="3200" b="0" i="0" u="none" strike="noStrike" dirty="0">
+                      <a:r>
+                        <a:rPr lang="en-US" sz="3100" noProof="1">
+                          <a:latin typeface="Courier New" panose="02070309020205020404" pitchFamily="49" charset="0"/>
+                          <a:cs typeface="Courier New" panose="02070309020205020404" pitchFamily="49" charset="0"/>
+                        </a:rPr>
+                        <a:t> </a:t>
+                      </a:r>
+                      <a:endParaRPr lang="en-US" sz="3100" b="0" i="0" u="none" strike="noStrike" noProof="1">
                         <a:effectLst/>
                         <a:latin typeface="Courier New" panose="02070309020205020404" pitchFamily="49" charset="0"/>
                         <a:cs typeface="Courier New" panose="02070309020205020404" pitchFamily="49" charset="0"/>
@@ -9975,12 +10102,46 @@
           </a:graphicData>
         </a:graphic>
       </p:graphicFrame>
+      <p:sp>
+        <p:nvSpPr>
+          <p:cNvPr id="9" name="Text Placeholder 3">
+            <a:extLst>
+              <a:ext uri="{FF2B5EF4-FFF2-40B4-BE49-F238E27FC236}">
+                <a16:creationId xmlns:a16="http://schemas.microsoft.com/office/drawing/2014/main" id="{82A1689F-6CFE-40C0-8CD4-C5309497A020}"/>
+              </a:ext>
+            </a:extLst>
+          </p:cNvPr>
+          <p:cNvSpPr>
+            <a:spLocks noGrp="1"/>
+          </p:cNvSpPr>
+          <p:nvPr>
+            <p:ph type="body" idx="1"/>
+          </p:nvPr>
+        </p:nvSpPr>
+        <p:spPr>
+          <a:xfrm>
+            <a:off x="975444" y="6589618"/>
+            <a:ext cx="21463931" cy="1220554"/>
+          </a:xfrm>
+        </p:spPr>
+        <p:txBody>
+          <a:bodyPr/>
+          <a:lstStyle/>
+          <a:p>
+            <a:r>
+              <a:rPr lang="en-US" dirty="0"/>
+              <a:t>Results (ordered by Company to show some people from both tables):</a:t>
+            </a:r>
+            <a:endParaRPr lang="pt-PT" dirty="0"/>
+          </a:p>
+        </p:txBody>
+      </p:sp>
       <p:pic>
         <p:nvPicPr>
-          <p:cNvPr id="7" name="Picture 6">
+          <p:cNvPr id="4" name="Picture 3">
             <a:extLst>
               <a:ext uri="{FF2B5EF4-FFF2-40B4-BE49-F238E27FC236}">
-                <a16:creationId xmlns:a16="http://schemas.microsoft.com/office/drawing/2014/main" id="{8C92233E-C814-4236-87C1-78247CBDB70D}"/>
+                <a16:creationId xmlns:a16="http://schemas.microsoft.com/office/drawing/2014/main" id="{10058D08-5F05-421C-9D9A-35812B7E7004}"/>
               </a:ext>
             </a:extLst>
           </p:cNvPr>
@@ -9997,48 +10158,14 @@
         </p:blipFill>
         <p:spPr>
           <a:xfrm>
-            <a:off x="571145" y="7770610"/>
-            <a:ext cx="22266983" cy="5061825"/>
+            <a:off x="195146" y="8134358"/>
+            <a:ext cx="23018981" cy="4334330"/>
           </a:xfrm>
           <a:prstGeom prst="rect">
             <a:avLst/>
           </a:prstGeom>
         </p:spPr>
       </p:pic>
-      <p:sp>
-        <p:nvSpPr>
-          <p:cNvPr id="9" name="Text Placeholder 3">
-            <a:extLst>
-              <a:ext uri="{FF2B5EF4-FFF2-40B4-BE49-F238E27FC236}">
-                <a16:creationId xmlns:a16="http://schemas.microsoft.com/office/drawing/2014/main" id="{82A1689F-6CFE-40C0-8CD4-C5309497A020}"/>
-              </a:ext>
-            </a:extLst>
-          </p:cNvPr>
-          <p:cNvSpPr>
-            <a:spLocks noGrp="1"/>
-          </p:cNvSpPr>
-          <p:nvPr>
-            <p:ph type="body" idx="1"/>
-          </p:nvPr>
-        </p:nvSpPr>
-        <p:spPr>
-          <a:xfrm>
-            <a:off x="975444" y="6589618"/>
-            <a:ext cx="21463931" cy="1220554"/>
-          </a:xfrm>
-        </p:spPr>
-        <p:txBody>
-          <a:bodyPr/>
-          <a:lstStyle/>
-          <a:p>
-            <a:r>
-              <a:rPr lang="en-US" dirty="0"/>
-              <a:t>Results (ordered by Company to show some people from both tables):</a:t>
-            </a:r>
-            <a:endParaRPr lang="pt-PT" dirty="0"/>
-          </a:p>
-        </p:txBody>
-      </p:sp>
     </p:spTree>
   </p:cSld>
   <p:clrMapOvr>

</xml_diff>